<commit_message>
New Presentation from me, and css modified
</commit_message>
<xml_diff>
--- a/Documentation/Praesentation/content/praesentation_teil_markus.pptx
+++ b/Documentation/Praesentation/content/praesentation_teil_markus.pptx
@@ -11,11 +11,11 @@
     <p:sldId id="256" r:id="rId2"/>
     <p:sldId id="257" r:id="rId3"/>
     <p:sldId id="258" r:id="rId4"/>
-    <p:sldId id="259" r:id="rId5"/>
-    <p:sldId id="260" r:id="rId6"/>
-    <p:sldId id="261" r:id="rId7"/>
-    <p:sldId id="262" r:id="rId8"/>
-    <p:sldId id="263" r:id="rId9"/>
+    <p:sldId id="260" r:id="rId5"/>
+    <p:sldId id="261" r:id="rId6"/>
+    <p:sldId id="262" r:id="rId7"/>
+    <p:sldId id="263" r:id="rId8"/>
+    <p:sldId id="264" r:id="rId9"/>
   </p:sldIdLst>
   <p:sldSz cx="9144000" cy="6858000" type="screen4x3"/>
   <p:notesSz cx="6858000" cy="9144000"/>
@@ -199,7 +199,7 @@
           <a:p>
             <a:fld id="{A1ABF161-85A2-F54C-8659-B68451E9DF7A}" type="datetimeFigureOut">
               <a:rPr lang="de-DE" smtClean="0"/>
-              <a:t>10.06.12</a:t>
+              <a:t>12.06.12</a:t>
             </a:fld>
             <a:endParaRPr lang="de-DE"/>
           </a:p>
@@ -1000,14 +1000,6 @@
 <file path=ppt/notesSlides/notesSlide3.xml><?xml version="1.0" encoding="utf-8"?>
 <p:notes xmlns:a="http://schemas.openxmlformats.org/drawingml/2006/main" xmlns:r="http://schemas.openxmlformats.org/officeDocument/2006/relationships" xmlns:p="http://schemas.openxmlformats.org/presentationml/2006/main">
   <p:cSld>
-    <p:bg>
-      <p:bgPr>
-        <a:solidFill>
-          <a:srgbClr val="FFFFFF"/>
-        </a:solidFill>
-        <a:effectLst/>
-      </p:bgPr>
-    </p:bg>
     <p:spTree>
       <p:nvGrpSpPr>
         <p:cNvPr id="1" name=""/>
@@ -1024,174 +1016,55 @@
       </p:grpSpPr>
       <p:sp>
         <p:nvSpPr>
-          <p:cNvPr id="7" name="Rectangle 6"/>
-          <p:cNvSpPr>
-            <a:spLocks noGrp="1" noChangeArrowheads="1"/>
-          </p:cNvSpPr>
-          <p:nvPr>
-            <p:ph type="sldNum"/>
-          </p:nvPr>
-        </p:nvSpPr>
-        <p:spPr>
-          <a:ln/>
-        </p:spPr>
-        <p:txBody>
-          <a:bodyPr/>
-          <a:lstStyle/>
-          <a:p>
-            <a:fld id="{54662675-1F3E-48BC-B7CD-52161B60B7A1}" type="slidenum">
-              <a:rPr lang="de-DE"/>
-              <a:pPr/>
-              <a:t>4</a:t>
-            </a:fld>
-            <a:endParaRPr lang="de-DE"/>
-          </a:p>
-        </p:txBody>
-      </p:sp>
-      <p:sp>
-        <p:nvSpPr>
-          <p:cNvPr id="64513" name="Rectangle 1"/>
-          <p:cNvSpPr txBox="1">
-            <a:spLocks noGrp="1" noRot="1" noChangeAspect="1" noChangeArrowheads="1"/>
+          <p:cNvPr id="2" name="Folienbildplatzhalter 1"/>
+          <p:cNvSpPr>
+            <a:spLocks noGrp="1" noRot="1" noChangeAspect="1"/>
           </p:cNvSpPr>
           <p:nvPr>
             <p:ph type="sldImg"/>
           </p:nvPr>
         </p:nvSpPr>
-        <p:spPr bwMode="auto">
-          <a:xfrm>
-            <a:off x="1003786" y="695134"/>
-            <a:ext cx="4848989" cy="3428152"/>
-          </a:xfrm>
-          <a:prstGeom prst="rect">
-            <a:avLst/>
-          </a:prstGeom>
-          <a:solidFill>
-            <a:srgbClr val="FFFFFF"/>
-          </a:solidFill>
-          <a:ln>
-            <a:solidFill>
-              <a:srgbClr val="000000"/>
-            </a:solidFill>
-            <a:miter lim="800000"/>
-            <a:headEnd/>
-            <a:tailEnd/>
-          </a:ln>
-          <a:extLst>
-            <a:ext uri="{AF507438-7753-43e0-B8FC-AC1667EBCBE1}">
-              <a14:hiddenEffects xmlns:a14="http://schemas.microsoft.com/office/drawing/2010/main">
-                <a:effectLst>
-                  <a:outerShdw dist="35921" dir="2700000" algn="ctr" rotWithShape="0">
-                    <a:srgbClr val="808080"/>
-                  </a:outerShdw>
-                </a:effectLst>
-              </a14:hiddenEffects>
-            </a:ext>
-          </a:extLst>
-        </p:spPr>
-      </p:sp>
-      <p:sp>
-        <p:nvSpPr>
-          <p:cNvPr id="64514" name="Rectangle 2"/>
-          <p:cNvSpPr txBox="1">
-            <a:spLocks noGrp="1" noChangeArrowheads="1"/>
+        <p:spPr/>
+      </p:sp>
+      <p:sp>
+        <p:nvSpPr>
+          <p:cNvPr id="3" name="Notizenplatzhalter 2"/>
+          <p:cNvSpPr>
+            <a:spLocks noGrp="1"/>
           </p:cNvSpPr>
           <p:nvPr>
             <p:ph type="body" idx="1"/>
           </p:nvPr>
         </p:nvSpPr>
-        <p:spPr bwMode="auto">
-          <a:xfrm>
-            <a:off x="685512" y="4343230"/>
-            <a:ext cx="5486976" cy="4115139"/>
-          </a:xfrm>
-          <a:prstGeom prst="rect">
-            <a:avLst/>
-          </a:prstGeom>
-          <a:noFill/>
-          <a:ln/>
-          <a:extLst>
-            <a:ext uri="{909E8E84-426E-40dd-AFC4-6F175D3DCCD1}">
-              <a14:hiddenFill xmlns:a14="http://schemas.microsoft.com/office/drawing/2010/main">
-                <a:solidFill>
-                  <a:srgbClr val="FFFFFF"/>
-                </a:solidFill>
-              </a14:hiddenFill>
-            </a:ext>
-            <a:ext uri="{91240B29-F687-4f45-9708-019B960494DF}">
-              <a14:hiddenLine xmlns:a14="http://schemas.microsoft.com/office/drawing/2010/main" w="9525">
-                <a:solidFill>
-                  <a:srgbClr val="000000"/>
-                </a:solidFill>
-                <a:round/>
-                <a:headEnd/>
-                <a:tailEnd/>
-              </a14:hiddenLine>
-            </a:ext>
-            <a:ext uri="{AF507438-7753-43e0-B8FC-AC1667EBCBE1}">
-              <a14:hiddenEffects xmlns:a14="http://schemas.microsoft.com/office/drawing/2010/main">
-                <a:effectLst>
-                  <a:outerShdw dist="35921" dir="2700000" algn="ctr" rotWithShape="0">
-                    <a:srgbClr val="808080"/>
-                  </a:outerShdw>
-                </a:effectLst>
-              </a14:hiddenEffects>
-            </a:ext>
-          </a:extLst>
-        </p:spPr>
-        <p:txBody>
-          <a:bodyPr wrap="none" anchor="ctr"/>
-          <a:lstStyle/>
-          <a:p>
-            <a:endParaRPr lang="en-US"/>
-          </a:p>
-        </p:txBody>
-      </p:sp>
-    </p:spTree>
-  </p:cSld>
-  <p:clrMapOvr>
-    <a:masterClrMapping/>
-  </p:clrMapOvr>
-</p:notes>
-</file>
-
-<file path=ppt/notesSlides/notesSlide4.xml><?xml version="1.0" encoding="utf-8"?>
-<p:notes xmlns:a="http://schemas.openxmlformats.org/drawingml/2006/main" xmlns:r="http://schemas.openxmlformats.org/officeDocument/2006/relationships" xmlns:p="http://schemas.openxmlformats.org/presentationml/2006/main">
-  <p:cSld>
-    <p:spTree>
-      <p:nvGrpSpPr>
-        <p:cNvPr id="1" name=""/>
-        <p:cNvGrpSpPr/>
-        <p:nvPr/>
-      </p:nvGrpSpPr>
-      <p:grpSpPr>
-        <a:xfrm>
-          <a:off x="0" y="0"/>
-          <a:ext cx="0" cy="0"/>
-          <a:chOff x="0" y="0"/>
-          <a:chExt cx="0" cy="0"/>
-        </a:xfrm>
-      </p:grpSpPr>
-      <p:sp>
-        <p:nvSpPr>
-          <p:cNvPr id="2" name="Folienbildplatzhalter 1"/>
-          <p:cNvSpPr>
-            <a:spLocks noGrp="1" noRot="1" noChangeAspect="1"/>
-          </p:cNvSpPr>
-          <p:nvPr>
-            <p:ph type="sldImg"/>
-          </p:nvPr>
-        </p:nvSpPr>
         <p:spPr/>
-      </p:sp>
-      <p:sp>
-        <p:nvSpPr>
-          <p:cNvPr id="3" name="Notizenplatzhalter 2"/>
-          <p:cNvSpPr>
-            <a:spLocks noGrp="1"/>
-          </p:cNvSpPr>
-          <p:nvPr>
-            <p:ph type="body" idx="1"/>
+        <p:txBody>
+          <a:bodyPr/>
+          <a:lstStyle/>
+          <a:p>
+            <a:r>
+              <a:rPr lang="de-DE" dirty="0" smtClean="0"/>
+              <a:t>Reference </a:t>
+            </a:r>
+            <a:r>
+              <a:rPr lang="de-DE" dirty="0" err="1" smtClean="0"/>
+              <a:t>to</a:t>
+            </a:r>
+            <a:r>
+              <a:rPr lang="de-DE" dirty="0" smtClean="0"/>
+              <a:t> Stefan</a:t>
+            </a:r>
+            <a:endParaRPr lang="de-DE" dirty="0"/>
+          </a:p>
+        </p:txBody>
+      </p:sp>
+      <p:sp>
+        <p:nvSpPr>
+          <p:cNvPr id="4" name="Foliennummernplatzhalter 3"/>
+          <p:cNvSpPr>
+            <a:spLocks noGrp="1"/>
+          </p:cNvSpPr>
+          <p:nvPr>
+            <p:ph type="sldNum" sz="quarter" idx="10"/>
           </p:nvPr>
         </p:nvSpPr>
         <p:spPr/>
@@ -1199,40 +1072,9 @@
           <a:bodyPr/>
           <a:lstStyle/>
           <a:p>
-            <a:r>
-              <a:rPr lang="de-DE" dirty="0" err="1" smtClean="0"/>
-              <a:t>Eventually</a:t>
-            </a:r>
-            <a:r>
-              <a:rPr lang="de-DE" dirty="0" smtClean="0"/>
-              <a:t> </a:t>
-            </a:r>
-            <a:r>
-              <a:rPr lang="de-DE" dirty="0" err="1" smtClean="0"/>
-              <a:t>statepattern-example</a:t>
-            </a:r>
-            <a:endParaRPr lang="de-DE" dirty="0"/>
-          </a:p>
-        </p:txBody>
-      </p:sp>
-      <p:sp>
-        <p:nvSpPr>
-          <p:cNvPr id="4" name="Foliennummernplatzhalter 3"/>
-          <p:cNvSpPr>
-            <a:spLocks noGrp="1"/>
-          </p:cNvSpPr>
-          <p:nvPr>
-            <p:ph type="sldNum" sz="quarter" idx="10"/>
-          </p:nvPr>
-        </p:nvSpPr>
-        <p:spPr/>
-        <p:txBody>
-          <a:bodyPr/>
-          <a:lstStyle/>
-          <a:p>
             <a:fld id="{3980AEB2-C199-9048-A2B7-7DA9A47AD0EB}" type="slidenum">
               <a:rPr lang="de-DE" smtClean="0"/>
-              <a:t>8</a:t>
+              <a:t>7</a:t>
             </a:fld>
             <a:endParaRPr lang="de-DE"/>
           </a:p>
@@ -1432,7 +1274,7 @@
           <a:p>
             <a:fld id="{1C0E3901-F8F4-CD4C-AF8B-F2099A9B8910}" type="datetimeFigureOut">
               <a:rPr lang="de-DE" smtClean="0"/>
-              <a:t>10.06.12</a:t>
+              <a:t>12.06.12</a:t>
             </a:fld>
             <a:endParaRPr lang="de-DE"/>
           </a:p>
@@ -1602,7 +1444,7 @@
           <a:p>
             <a:fld id="{1C0E3901-F8F4-CD4C-AF8B-F2099A9B8910}" type="datetimeFigureOut">
               <a:rPr lang="de-DE" smtClean="0"/>
-              <a:t>10.06.12</a:t>
+              <a:t>12.06.12</a:t>
             </a:fld>
             <a:endParaRPr lang="de-DE"/>
           </a:p>
@@ -1782,7 +1624,7 @@
           <a:p>
             <a:fld id="{1C0E3901-F8F4-CD4C-AF8B-F2099A9B8910}" type="datetimeFigureOut">
               <a:rPr lang="de-DE" smtClean="0"/>
-              <a:t>10.06.12</a:t>
+              <a:t>12.06.12</a:t>
             </a:fld>
             <a:endParaRPr lang="de-DE"/>
           </a:p>
@@ -2099,7 +1941,7 @@
           <a:p>
             <a:fld id="{1C0E3901-F8F4-CD4C-AF8B-F2099A9B8910}" type="datetimeFigureOut">
               <a:rPr lang="de-DE" smtClean="0"/>
-              <a:t>10.06.12</a:t>
+              <a:t>12.06.12</a:t>
             </a:fld>
             <a:endParaRPr lang="de-DE"/>
           </a:p>
@@ -2345,7 +2187,7 @@
           <a:p>
             <a:fld id="{1C0E3901-F8F4-CD4C-AF8B-F2099A9B8910}" type="datetimeFigureOut">
               <a:rPr lang="de-DE" smtClean="0"/>
-              <a:t>10.06.12</a:t>
+              <a:t>12.06.12</a:t>
             </a:fld>
             <a:endParaRPr lang="de-DE"/>
           </a:p>
@@ -2633,7 +2475,7 @@
           <a:p>
             <a:fld id="{1C0E3901-F8F4-CD4C-AF8B-F2099A9B8910}" type="datetimeFigureOut">
               <a:rPr lang="de-DE" smtClean="0"/>
-              <a:t>10.06.12</a:t>
+              <a:t>12.06.12</a:t>
             </a:fld>
             <a:endParaRPr lang="de-DE"/>
           </a:p>
@@ -3055,7 +2897,7 @@
           <a:p>
             <a:fld id="{1C0E3901-F8F4-CD4C-AF8B-F2099A9B8910}" type="datetimeFigureOut">
               <a:rPr lang="de-DE" smtClean="0"/>
-              <a:t>10.06.12</a:t>
+              <a:t>12.06.12</a:t>
             </a:fld>
             <a:endParaRPr lang="de-DE"/>
           </a:p>
@@ -3173,7 +3015,7 @@
           <a:p>
             <a:fld id="{1C0E3901-F8F4-CD4C-AF8B-F2099A9B8910}" type="datetimeFigureOut">
               <a:rPr lang="de-DE" smtClean="0"/>
-              <a:t>10.06.12</a:t>
+              <a:t>12.06.12</a:t>
             </a:fld>
             <a:endParaRPr lang="de-DE"/>
           </a:p>
@@ -3268,7 +3110,7 @@
           <a:p>
             <a:fld id="{1C0E3901-F8F4-CD4C-AF8B-F2099A9B8910}" type="datetimeFigureOut">
               <a:rPr lang="de-DE" smtClean="0"/>
-              <a:t>10.06.12</a:t>
+              <a:t>12.06.12</a:t>
             </a:fld>
             <a:endParaRPr lang="de-DE"/>
           </a:p>
@@ -3545,7 +3387,7 @@
           <a:p>
             <a:fld id="{1C0E3901-F8F4-CD4C-AF8B-F2099A9B8910}" type="datetimeFigureOut">
               <a:rPr lang="de-DE" smtClean="0"/>
-              <a:t>10.06.12</a:t>
+              <a:t>12.06.12</a:t>
             </a:fld>
             <a:endParaRPr lang="de-DE"/>
           </a:p>
@@ -3798,7 +3640,7 @@
           <a:p>
             <a:fld id="{1C0E3901-F8F4-CD4C-AF8B-F2099A9B8910}" type="datetimeFigureOut">
               <a:rPr lang="de-DE" smtClean="0"/>
-              <a:t>10.06.12</a:t>
+              <a:t>12.06.12</a:t>
             </a:fld>
             <a:endParaRPr lang="de-DE"/>
           </a:p>
@@ -4011,7 +3853,7 @@
           <a:p>
             <a:fld id="{1C0E3901-F8F4-CD4C-AF8B-F2099A9B8910}" type="datetimeFigureOut">
               <a:rPr lang="de-DE" smtClean="0"/>
-              <a:t>10.06.12</a:t>
+              <a:t>12.06.12</a:t>
             </a:fld>
             <a:endParaRPr lang="de-DE"/>
           </a:p>
@@ -4443,6 +4285,13 @@
   <p:clrMapOvr>
     <a:masterClrMapping/>
   </p:clrMapOvr>
+  <p:timing>
+    <p:tnLst>
+      <p:par>
+        <p:cTn xmlns:p14="http://schemas.microsoft.com/office/powerpoint/2010/main" id="1" dur="indefinite" restart="never" nodeType="tmRoot"/>
+      </p:par>
+    </p:tnLst>
+  </p:timing>
 </p:sld>
 </file>
 
@@ -4773,9 +4622,9 @@
       </p:sp>
       <p:pic>
         <p:nvPicPr>
-          <p:cNvPr id="59394" name="Picture 2"/>
+          <p:cNvPr id="3" name="Bild 2" descr="Package_diagram-1.jpg"/>
           <p:cNvPicPr>
-            <a:picLocks noChangeAspect="1" noChangeArrowheads="1"/>
+            <a:picLocks noChangeAspect="1"/>
           </p:cNvPicPr>
           <p:nvPr/>
         </p:nvPicPr>
@@ -4791,51 +4640,14 @@
             <a:fillRect/>
           </a:stretch>
         </p:blipFill>
-        <p:spPr bwMode="auto">
+        <p:spPr>
           <a:xfrm>
-            <a:off x="1961743" y="1468954"/>
-            <a:ext cx="5409154" cy="5224869"/>
+            <a:off x="0" y="2089600"/>
+            <a:ext cx="9144000" cy="4768400"/>
           </a:xfrm>
           <a:prstGeom prst="rect">
             <a:avLst/>
           </a:prstGeom>
-          <a:noFill/>
-          <a:ln>
-            <a:noFill/>
-          </a:ln>
-          <a:effectLst/>
-          <a:extLst>
-            <a:ext uri="{909E8E84-426E-40dd-AFC4-6F175D3DCCD1}">
-              <a14:hiddenFill xmlns:a14="http://schemas.microsoft.com/office/drawing/2010/main">
-                <a:blipFill dpi="0" rotWithShape="0">
-                  <a:blip/>
-                  <a:srcRect/>
-                  <a:stretch>
-                    <a:fillRect/>
-                  </a:stretch>
-                </a:blipFill>
-              </a14:hiddenFill>
-            </a:ext>
-            <a:ext uri="{91240B29-F687-4f45-9708-019B960494DF}">
-              <a14:hiddenLine xmlns:a14="http://schemas.microsoft.com/office/drawing/2010/main" w="9525">
-                <a:solidFill>
-                  <a:srgbClr val="000000"/>
-                </a:solidFill>
-                <a:round/>
-                <a:headEnd/>
-                <a:tailEnd/>
-              </a14:hiddenLine>
-            </a:ext>
-            <a:ext uri="{AF507438-7753-43e0-B8FC-AC1667EBCBE1}">
-              <a14:hiddenEffects xmlns:a14="http://schemas.microsoft.com/office/drawing/2010/main">
-                <a:effectLst>
-                  <a:outerShdw dist="35921" dir="2700000" algn="ctr" rotWithShape="0">
-                    <a:srgbClr val="808080"/>
-                  </a:outerShdw>
-                </a:effectLst>
-              </a14:hiddenEffects>
-            </a:ext>
-          </a:extLst>
         </p:spPr>
       </p:pic>
     </p:spTree>
@@ -4898,398 +4710,251 @@
       </p:grpSpPr>
       <p:sp>
         <p:nvSpPr>
-          <p:cNvPr id="60417" name="Rectangle 1"/>
-          <p:cNvSpPr>
-            <a:spLocks noGrp="1" noChangeArrowheads="1"/>
-          </p:cNvSpPr>
-          <p:nvPr>
-            <p:ph type="title" idx="4294967295"/>
-          </p:nvPr>
-        </p:nvSpPr>
-        <p:spPr>
-          <a:xfrm>
-            <a:off x="456481" y="469490"/>
-            <a:ext cx="8228160" cy="1144921"/>
-          </a:xfrm>
-          <a:ln/>
-        </p:spPr>
-        <p:txBody>
-          <a:bodyPr tIns="35203"/>
-          <a:lstStyle/>
-          <a:p>
-            <a:pPr>
-              <a:tabLst>
-                <a:tab pos="656650" algn="l"/>
-                <a:tab pos="1313299" algn="l"/>
-                <a:tab pos="1969949" algn="l"/>
-                <a:tab pos="2626599" algn="l"/>
-                <a:tab pos="3283248" algn="l"/>
-                <a:tab pos="3939898" algn="l"/>
-                <a:tab pos="4596548" algn="l"/>
-                <a:tab pos="5253198" algn="l"/>
-                <a:tab pos="5909847" algn="l"/>
-                <a:tab pos="6566497" algn="l"/>
-                <a:tab pos="7223147" algn="l"/>
-                <a:tab pos="7879796" algn="l"/>
-              </a:tabLst>
-            </a:pPr>
-            <a:r>
-              <a:rPr lang="de-DE"/>
+          <p:cNvPr id="2" name="Titel 1"/>
+          <p:cNvSpPr>
+            <a:spLocks noGrp="1"/>
+          </p:cNvSpPr>
+          <p:nvPr>
+            <p:ph type="title"/>
+          </p:nvPr>
+        </p:nvSpPr>
+        <p:spPr/>
+        <p:txBody>
+          <a:bodyPr/>
+          <a:lstStyle/>
+          <a:p>
+            <a:r>
+              <a:rPr lang="de-DE" dirty="0" smtClean="0"/>
               <a:t>Layer</a:t>
             </a:r>
-          </a:p>
-        </p:txBody>
-      </p:sp>
-      <p:sp>
-        <p:nvSpPr>
-          <p:cNvPr id="60418" name="Rectangle 2"/>
-          <p:cNvSpPr>
-            <a:spLocks noGrp="1" noChangeArrowheads="1"/>
-          </p:cNvSpPr>
-          <p:nvPr>
-            <p:ph type="body" idx="4294967295"/>
-          </p:nvPr>
-        </p:nvSpPr>
-        <p:spPr>
-          <a:xfrm>
-            <a:off x="456481" y="1960047"/>
-            <a:ext cx="8228160" cy="4189399"/>
-          </a:xfrm>
-          <a:ln/>
-        </p:spPr>
-        <p:txBody>
-          <a:bodyPr tIns="20802"/>
-          <a:lstStyle/>
-          <a:p>
-            <a:pPr marL="391686" indent="-293764">
-              <a:buClr>
-                <a:srgbClr val="E6E6FF"/>
-              </a:buClr>
-              <a:buSzPct val="45000"/>
-              <a:buFont typeface="Wingdings" charset="2"/>
-              <a:buChar char=""/>
-              <a:tabLst>
-                <a:tab pos="656650" algn="l"/>
-                <a:tab pos="1313299" algn="l"/>
-                <a:tab pos="1969949" algn="l"/>
-                <a:tab pos="2626599" algn="l"/>
-                <a:tab pos="3283248" algn="l"/>
-                <a:tab pos="3939898" algn="l"/>
-                <a:tab pos="4596548" algn="l"/>
-                <a:tab pos="5253198" algn="l"/>
-                <a:tab pos="5909847" algn="l"/>
-                <a:tab pos="6566497" algn="l"/>
-                <a:tab pos="7223147" algn="l"/>
-                <a:tab pos="7879796" algn="l"/>
-              </a:tabLst>
-            </a:pPr>
-            <a:r>
-              <a:rPr lang="de-DE" sz="2400" dirty="0"/>
-              <a:t>View</a:t>
-            </a:r>
-          </a:p>
-          <a:p>
-            <a:pPr marL="1566743" lvl="1" indent="-519848">
-              <a:buClr>
-                <a:srgbClr val="E6E6FF"/>
-              </a:buClr>
-              <a:buSzPct val="75000"/>
-              <a:buFont typeface="Symbol" charset="2"/>
-              <a:buChar char=""/>
-              <a:tabLst>
-                <a:tab pos="656650" algn="l"/>
-                <a:tab pos="1313299" algn="l"/>
-                <a:tab pos="1969949" algn="l"/>
-                <a:tab pos="2626599" algn="l"/>
-                <a:tab pos="3283248" algn="l"/>
-                <a:tab pos="3939898" algn="l"/>
-                <a:tab pos="4596548" algn="l"/>
-                <a:tab pos="5253198" algn="l"/>
-                <a:tab pos="5909847" algn="l"/>
-                <a:tab pos="6566497" algn="l"/>
-                <a:tab pos="7223147" algn="l"/>
-                <a:tab pos="7879796" algn="l"/>
-              </a:tabLst>
-            </a:pPr>
-            <a:r>
-              <a:rPr lang="de-DE" sz="2400" dirty="0"/>
-              <a:t>GUI</a:t>
-            </a:r>
-          </a:p>
-          <a:p>
-            <a:pPr marL="391686" indent="-293764">
-              <a:buClr>
-                <a:srgbClr val="E6E6FF"/>
-              </a:buClr>
-              <a:buSzPct val="45000"/>
-              <a:buFont typeface="Wingdings" charset="2"/>
-              <a:buChar char=""/>
-              <a:tabLst>
-                <a:tab pos="656650" algn="l"/>
-                <a:tab pos="1313299" algn="l"/>
-                <a:tab pos="1969949" algn="l"/>
-                <a:tab pos="2626599" algn="l"/>
-                <a:tab pos="3283248" algn="l"/>
-                <a:tab pos="3939898" algn="l"/>
-                <a:tab pos="4596548" algn="l"/>
-                <a:tab pos="5253198" algn="l"/>
-                <a:tab pos="5909847" algn="l"/>
-                <a:tab pos="6566497" algn="l"/>
-                <a:tab pos="7223147" algn="l"/>
-                <a:tab pos="7879796" algn="l"/>
-              </a:tabLst>
-            </a:pPr>
-            <a:r>
-              <a:rPr lang="de-DE" sz="2400" dirty="0"/>
-              <a:t>Controller</a:t>
-            </a:r>
-          </a:p>
-          <a:p>
-            <a:pPr marL="1566743" lvl="1" indent="-519848">
-              <a:buClr>
-                <a:srgbClr val="E6E6FF"/>
-              </a:buClr>
-              <a:buSzPct val="75000"/>
-              <a:buFont typeface="Symbol" charset="2"/>
-              <a:buChar char=""/>
-              <a:tabLst>
-                <a:tab pos="656650" algn="l"/>
-                <a:tab pos="1313299" algn="l"/>
-                <a:tab pos="1969949" algn="l"/>
-                <a:tab pos="2626599" algn="l"/>
-                <a:tab pos="3283248" algn="l"/>
-                <a:tab pos="3939898" algn="l"/>
-                <a:tab pos="4596548" algn="l"/>
-                <a:tab pos="5253198" algn="l"/>
-                <a:tab pos="5909847" algn="l"/>
-                <a:tab pos="6566497" algn="l"/>
-                <a:tab pos="7223147" algn="l"/>
-                <a:tab pos="7879796" algn="l"/>
-              </a:tabLst>
-            </a:pPr>
-            <a:r>
-              <a:rPr lang="de-DE" sz="2400" dirty="0" err="1"/>
-              <a:t>Coordination</a:t>
-            </a:r>
-            <a:endParaRPr lang="de-DE" sz="2400" dirty="0"/>
-          </a:p>
-          <a:p>
-            <a:pPr marL="1566743" lvl="1" indent="-519848">
-              <a:buClr>
-                <a:srgbClr val="E6E6FF"/>
-              </a:buClr>
-              <a:buSzPct val="75000"/>
-              <a:buFont typeface="Symbol" charset="2"/>
-              <a:buChar char=""/>
-              <a:tabLst>
-                <a:tab pos="656650" algn="l"/>
-                <a:tab pos="1313299" algn="l"/>
-                <a:tab pos="1969949" algn="l"/>
-                <a:tab pos="2626599" algn="l"/>
-                <a:tab pos="3283248" algn="l"/>
-                <a:tab pos="3939898" algn="l"/>
-                <a:tab pos="4596548" algn="l"/>
-                <a:tab pos="5253198" algn="l"/>
-                <a:tab pos="5909847" algn="l"/>
-                <a:tab pos="6566497" algn="l"/>
-                <a:tab pos="7223147" algn="l"/>
-                <a:tab pos="7879796" algn="l"/>
-              </a:tabLst>
-            </a:pPr>
-            <a:r>
-              <a:rPr lang="de-DE" sz="2400" dirty="0" err="1"/>
-              <a:t>Domainspecific</a:t>
-            </a:r>
-            <a:r>
-              <a:rPr lang="de-DE" sz="2400" dirty="0"/>
-              <a:t> </a:t>
-            </a:r>
-            <a:r>
-              <a:rPr lang="de-DE" sz="2400" dirty="0" err="1"/>
-              <a:t>cycle</a:t>
-            </a:r>
-            <a:endParaRPr lang="de-DE" sz="2400" dirty="0"/>
-          </a:p>
-          <a:p>
-            <a:pPr marL="391686" indent="-293764">
-              <a:buClr>
-                <a:srgbClr val="E6E6FF"/>
-              </a:buClr>
-              <a:buSzPct val="45000"/>
-              <a:buFont typeface="Wingdings" charset="2"/>
-              <a:buChar char=""/>
-              <a:tabLst>
-                <a:tab pos="656650" algn="l"/>
-                <a:tab pos="1313299" algn="l"/>
-                <a:tab pos="1969949" algn="l"/>
-                <a:tab pos="2626599" algn="l"/>
-                <a:tab pos="3283248" algn="l"/>
-                <a:tab pos="3939898" algn="l"/>
-                <a:tab pos="4596548" algn="l"/>
-                <a:tab pos="5253198" algn="l"/>
-                <a:tab pos="5909847" algn="l"/>
-                <a:tab pos="6566497" algn="l"/>
-                <a:tab pos="7223147" algn="l"/>
-                <a:tab pos="7879796" algn="l"/>
-              </a:tabLst>
-            </a:pPr>
-            <a:r>
-              <a:rPr lang="de-DE" sz="2400" dirty="0"/>
-              <a:t>Model</a:t>
-            </a:r>
-          </a:p>
-          <a:p>
-            <a:pPr marL="1566743" lvl="1" indent="-519848">
-              <a:buClr>
-                <a:srgbClr val="E6E6FF"/>
-              </a:buClr>
-              <a:buSzPct val="75000"/>
-              <a:buFont typeface="Symbol" charset="2"/>
-              <a:buChar char=""/>
-              <a:tabLst>
-                <a:tab pos="656650" algn="l"/>
-                <a:tab pos="1313299" algn="l"/>
-                <a:tab pos="1969949" algn="l"/>
-                <a:tab pos="2626599" algn="l"/>
-                <a:tab pos="3283248" algn="l"/>
-                <a:tab pos="3939898" algn="l"/>
-                <a:tab pos="4596548" algn="l"/>
-                <a:tab pos="5253198" algn="l"/>
-                <a:tab pos="5909847" algn="l"/>
-                <a:tab pos="6566497" algn="l"/>
-                <a:tab pos="7223147" algn="l"/>
-                <a:tab pos="7879796" algn="l"/>
-              </a:tabLst>
-            </a:pPr>
-            <a:r>
-              <a:rPr lang="de-DE" sz="2400" dirty="0" err="1"/>
-              <a:t>Domainobjects</a:t>
-            </a:r>
-            <a:endParaRPr lang="de-DE" sz="2400" dirty="0"/>
-          </a:p>
-          <a:p>
-            <a:pPr marL="391686" indent="-293764">
-              <a:buClr>
-                <a:srgbClr val="E6E6FF"/>
-              </a:buClr>
-              <a:buSzPct val="45000"/>
-              <a:buFont typeface="Wingdings" charset="2"/>
-              <a:buChar char=""/>
-              <a:tabLst>
-                <a:tab pos="656650" algn="l"/>
-                <a:tab pos="1313299" algn="l"/>
-                <a:tab pos="1969949" algn="l"/>
-                <a:tab pos="2626599" algn="l"/>
-                <a:tab pos="3283248" algn="l"/>
-                <a:tab pos="3939898" algn="l"/>
-                <a:tab pos="4596548" algn="l"/>
-                <a:tab pos="5253198" algn="l"/>
-                <a:tab pos="5909847" algn="l"/>
-                <a:tab pos="6566497" algn="l"/>
-                <a:tab pos="7223147" algn="l"/>
-                <a:tab pos="7879796" algn="l"/>
-              </a:tabLst>
-            </a:pPr>
-            <a:r>
-              <a:rPr lang="de-DE" sz="2400" dirty="0" err="1"/>
-              <a:t>External</a:t>
-            </a:r>
-            <a:r>
-              <a:rPr lang="de-DE" sz="2400" dirty="0"/>
-              <a:t> </a:t>
-            </a:r>
-            <a:r>
-              <a:rPr lang="de-DE" sz="2400" dirty="0" err="1"/>
+            <a:endParaRPr lang="de-DE" dirty="0"/>
+          </a:p>
+        </p:txBody>
+      </p:sp>
+      <p:sp>
+        <p:nvSpPr>
+          <p:cNvPr id="3" name="Inhaltsplatzhalter 2"/>
+          <p:cNvSpPr>
+            <a:spLocks noGrp="1"/>
+          </p:cNvSpPr>
+          <p:nvPr>
+            <p:ph idx="1"/>
+          </p:nvPr>
+        </p:nvSpPr>
+        <p:spPr/>
+        <p:txBody>
+          <a:bodyPr/>
+          <a:lstStyle/>
+          <a:p>
+            <a:r>
+              <a:rPr lang="de-DE" dirty="0" smtClean="0"/>
+              <a:t>Database </a:t>
+            </a:r>
+            <a:r>
+              <a:rPr lang="de-DE" dirty="0" err="1" smtClean="0"/>
               <a:t>mapping</a:t>
             </a:r>
             <a:r>
-              <a:rPr lang="de-DE" sz="2400" dirty="0"/>
-              <a:t> </a:t>
-            </a:r>
-            <a:r>
-              <a:rPr lang="de-DE" sz="2400" dirty="0" err="1"/>
+              <a:rPr lang="de-DE" dirty="0" smtClean="0"/>
+              <a:t> </a:t>
+            </a:r>
+            <a:r>
+              <a:rPr lang="de-DE" dirty="0" err="1" smtClean="0"/>
               <a:t>layer</a:t>
             </a:r>
-            <a:endParaRPr lang="de-DE" sz="2400" dirty="0"/>
-          </a:p>
-          <a:p>
-            <a:pPr marL="1566743" lvl="1" indent="-519848">
-              <a:buClr>
-                <a:srgbClr val="E6E6FF"/>
-              </a:buClr>
-              <a:buSzPct val="75000"/>
-              <a:buFont typeface="Symbol" charset="2"/>
-              <a:buChar char=""/>
-              <a:tabLst>
-                <a:tab pos="656650" algn="l"/>
-                <a:tab pos="1313299" algn="l"/>
-                <a:tab pos="1969949" algn="l"/>
-                <a:tab pos="2626599" algn="l"/>
-                <a:tab pos="3283248" algn="l"/>
-                <a:tab pos="3939898" algn="l"/>
-                <a:tab pos="4596548" algn="l"/>
-                <a:tab pos="5253198" algn="l"/>
-                <a:tab pos="5909847" algn="l"/>
-                <a:tab pos="6566497" algn="l"/>
-                <a:tab pos="7223147" algn="l"/>
-                <a:tab pos="7879796" algn="l"/>
-              </a:tabLst>
-            </a:pPr>
-            <a:r>
-              <a:rPr lang="de-DE" sz="2400" dirty="0"/>
-              <a:t>Translation DB-</a:t>
-            </a:r>
-            <a:r>
-              <a:rPr lang="de-DE" sz="2400" dirty="0" err="1"/>
+            <a:endParaRPr lang="de-DE" dirty="0" smtClean="0"/>
+          </a:p>
+          <a:p>
+            <a:pPr lvl="1"/>
+            <a:r>
+              <a:rPr lang="de-DE" dirty="0" err="1" smtClean="0"/>
+              <a:t>Classes</a:t>
+            </a:r>
+            <a:r>
+              <a:rPr lang="de-DE" dirty="0" smtClean="0"/>
+              <a:t> </a:t>
+            </a:r>
+            <a:r>
+              <a:rPr lang="de-DE" dirty="0" err="1" smtClean="0"/>
+              <a:t>with</a:t>
+            </a:r>
+            <a:r>
+              <a:rPr lang="de-DE" dirty="0" smtClean="0"/>
+              <a:t> </a:t>
+            </a:r>
+            <a:r>
+              <a:rPr lang="de-DE" dirty="0" err="1" smtClean="0"/>
+              <a:t>annotations</a:t>
+            </a:r>
+            <a:r>
+              <a:rPr lang="de-DE" dirty="0" smtClean="0"/>
+              <a:t> </a:t>
+            </a:r>
+            <a:r>
+              <a:rPr lang="de-DE" dirty="0" err="1" smtClean="0"/>
+              <a:t>for</a:t>
+            </a:r>
+            <a:r>
+              <a:rPr lang="de-DE" dirty="0" smtClean="0"/>
+              <a:t> </a:t>
+            </a:r>
+            <a:r>
+              <a:rPr lang="de-DE" dirty="0" err="1" smtClean="0"/>
+              <a:t>Hibernate</a:t>
+            </a:r>
+            <a:endParaRPr lang="de-DE" dirty="0" smtClean="0"/>
+          </a:p>
+          <a:p>
+            <a:pPr lvl="2"/>
+            <a:r>
+              <a:rPr lang="de-DE" dirty="0" err="1" smtClean="0"/>
+              <a:t>Contain</a:t>
+            </a:r>
+            <a:r>
+              <a:rPr lang="de-DE" dirty="0" smtClean="0"/>
+              <a:t> </a:t>
+            </a:r>
+            <a:r>
+              <a:rPr lang="de-DE" dirty="0" err="1" smtClean="0"/>
+              <a:t>no</a:t>
+            </a:r>
+            <a:r>
+              <a:rPr lang="de-DE" dirty="0" smtClean="0"/>
+              <a:t> </a:t>
+            </a:r>
+            <a:r>
+              <a:rPr lang="de-DE" dirty="0" err="1" smtClean="0"/>
+              <a:t>logical</a:t>
+            </a:r>
+            <a:r>
+              <a:rPr lang="de-DE" dirty="0" smtClean="0"/>
+              <a:t> </a:t>
+            </a:r>
+            <a:r>
+              <a:rPr lang="de-DE" dirty="0" err="1" smtClean="0"/>
+              <a:t>functionality</a:t>
+            </a:r>
+            <a:endParaRPr lang="de-DE" dirty="0" smtClean="0"/>
+          </a:p>
+          <a:p>
+            <a:pPr lvl="1"/>
+            <a:r>
+              <a:rPr lang="de-DE" dirty="0" err="1" smtClean="0"/>
+              <a:t>Contains</a:t>
+            </a:r>
+            <a:r>
+              <a:rPr lang="de-DE" dirty="0" smtClean="0"/>
+              <a:t> manager-</a:t>
+            </a:r>
+            <a:r>
+              <a:rPr lang="de-DE" dirty="0" err="1" smtClean="0"/>
+              <a:t>classes</a:t>
+            </a:r>
+            <a:r>
+              <a:rPr lang="de-DE" dirty="0" smtClean="0"/>
+              <a:t> </a:t>
+            </a:r>
+            <a:r>
+              <a:rPr lang="de-DE" dirty="0" err="1" smtClean="0"/>
+              <a:t>for</a:t>
+            </a:r>
+            <a:r>
+              <a:rPr lang="de-DE" dirty="0" smtClean="0"/>
+              <a:t> </a:t>
+            </a:r>
+            <a:r>
+              <a:rPr lang="de-DE" dirty="0" err="1" smtClean="0"/>
+              <a:t>communication</a:t>
+            </a:r>
+            <a:r>
+              <a:rPr lang="de-DE" dirty="0" smtClean="0"/>
+              <a:t> </a:t>
+            </a:r>
+            <a:r>
+              <a:rPr lang="de-DE" dirty="0" err="1" smtClean="0"/>
+              <a:t>to</a:t>
+            </a:r>
+            <a:r>
+              <a:rPr lang="de-DE" dirty="0" smtClean="0"/>
+              <a:t> </a:t>
+            </a:r>
+            <a:r>
+              <a:rPr lang="de-DE" dirty="0" err="1" smtClean="0"/>
+              <a:t>database</a:t>
+            </a:r>
+            <a:r>
+              <a:rPr lang="de-DE" dirty="0" smtClean="0"/>
+              <a:t>:</a:t>
+            </a:r>
+          </a:p>
+          <a:p>
+            <a:pPr lvl="2"/>
+            <a:r>
+              <a:rPr lang="de-DE" dirty="0" err="1" smtClean="0"/>
+              <a:t>For</a:t>
+            </a:r>
+            <a:r>
+              <a:rPr lang="de-DE" dirty="0" smtClean="0"/>
+              <a:t> </a:t>
+            </a:r>
+            <a:r>
+              <a:rPr lang="de-DE" dirty="0" err="1" smtClean="0"/>
+              <a:t>saving</a:t>
+            </a:r>
+            <a:r>
+              <a:rPr lang="de-DE" dirty="0" smtClean="0"/>
+              <a:t> </a:t>
+            </a:r>
+            <a:r>
+              <a:rPr lang="de-DE" dirty="0" err="1" smtClean="0"/>
               <a:t>objects</a:t>
             </a:r>
-            <a:r>
-              <a:rPr lang="de-DE" sz="2400" dirty="0"/>
-              <a:t> ↔ </a:t>
-            </a:r>
-            <a:r>
-              <a:rPr lang="de-DE" sz="2400" dirty="0" err="1"/>
-              <a:t>Domainobjects</a:t>
-            </a:r>
-            <a:endParaRPr lang="de-DE" sz="2400" dirty="0"/>
+            <a:endParaRPr lang="de-DE" dirty="0" smtClean="0"/>
+          </a:p>
+          <a:p>
+            <a:pPr lvl="2"/>
+            <a:r>
+              <a:rPr lang="de-DE" dirty="0" err="1" smtClean="0"/>
+              <a:t>To</a:t>
+            </a:r>
+            <a:r>
+              <a:rPr lang="de-DE" dirty="0" smtClean="0"/>
+              <a:t> </a:t>
+            </a:r>
+            <a:r>
+              <a:rPr lang="de-DE" dirty="0" err="1" smtClean="0"/>
+              <a:t>retrieve</a:t>
+            </a:r>
+            <a:r>
+              <a:rPr lang="de-DE" dirty="0" smtClean="0"/>
+              <a:t> </a:t>
+            </a:r>
+            <a:r>
+              <a:rPr lang="de-DE" dirty="0" err="1" smtClean="0"/>
+              <a:t>objects</a:t>
+            </a:r>
+            <a:endParaRPr lang="de-DE" dirty="0" smtClean="0"/>
+          </a:p>
+          <a:p>
+            <a:pPr lvl="1"/>
+            <a:endParaRPr lang="de-DE" dirty="0"/>
           </a:p>
         </p:txBody>
       </p:sp>
     </p:spTree>
     <p:extLst>
       <p:ext uri="{BB962C8B-B14F-4D97-AF65-F5344CB8AC3E}">
-        <p14:creationId xmlns:p14="http://schemas.microsoft.com/office/powerpoint/2010/main" val="505436482"/>
+        <p14:creationId xmlns:p14="http://schemas.microsoft.com/office/powerpoint/2010/main" val="1336650562"/>
       </p:ext>
     </p:extLst>
   </p:cSld>
   <p:clrMapOvr>
     <a:masterClrMapping/>
   </p:clrMapOvr>
-  <p:transition xmlns:p14="http://schemas.microsoft.com/office/powerpoint/2010/main" spd="med"/>
   <p:timing>
     <p:tnLst>
       <p:par>
-        <p:cTn xmlns:p14="http://schemas.microsoft.com/office/powerpoint/2010/main" id="1" dur="indefinite" restart="never" nodeType="tmRoot">
-          <p:childTnLst>
-            <p:seq concurrent="1" nextAc="seek">
-              <p:cTn id="2" dur="0" nodeType="mainSeq"/>
-              <p:prevCondLst>
-                <p:cond evt="onPrev" delay="0">
-                  <p:tgtEl>
-                    <p:sldTgt/>
-                  </p:tgtEl>
-                </p:cond>
-              </p:prevCondLst>
-              <p:nextCondLst>
-                <p:cond evt="onNext" delay="0">
-                  <p:tgtEl>
-                    <p:sldTgt/>
-                  </p:tgtEl>
-                </p:cond>
-              </p:nextCondLst>
-            </p:seq>
-          </p:childTnLst>
-        </p:cTn>
+        <p:cTn xmlns:p14="http://schemas.microsoft.com/office/powerpoint/2010/main" id="1" dur="indefinite" restart="never" nodeType="tmRoot"/>
       </p:par>
     </p:tnLst>
   </p:timing>
@@ -5352,200 +5017,171 @@
           <a:lstStyle/>
           <a:p>
             <a:r>
-              <a:rPr lang="de-DE" dirty="0" err="1" smtClean="0"/>
-              <a:t>External</a:t>
-            </a:r>
-            <a:r>
-              <a:rPr lang="de-DE" dirty="0" smtClean="0"/>
-              <a:t> </a:t>
-            </a:r>
-            <a:r>
-              <a:rPr lang="de-DE" dirty="0" err="1" smtClean="0"/>
-              <a:t>mapping</a:t>
-            </a:r>
-            <a:r>
-              <a:rPr lang="de-DE" dirty="0" smtClean="0"/>
-              <a:t> </a:t>
-            </a:r>
-            <a:r>
-              <a:rPr lang="de-DE" dirty="0" err="1" smtClean="0"/>
-              <a:t>layer</a:t>
+              <a:rPr lang="de-DE" dirty="0" smtClean="0"/>
+              <a:t>Model</a:t>
+            </a:r>
+          </a:p>
+          <a:p>
+            <a:pPr lvl="1"/>
+            <a:r>
+              <a:rPr lang="de-DE" dirty="0" err="1" smtClean="0"/>
+              <a:t>Contains</a:t>
+            </a:r>
+            <a:r>
+              <a:rPr lang="de-DE" dirty="0" smtClean="0"/>
+              <a:t> </a:t>
+            </a:r>
+            <a:r>
+              <a:rPr lang="de-DE" dirty="0" err="1" smtClean="0"/>
+              <a:t>classes</a:t>
+            </a:r>
+            <a:r>
+              <a:rPr lang="de-DE" dirty="0" smtClean="0"/>
+              <a:t> </a:t>
+            </a:r>
+            <a:r>
+              <a:rPr lang="de-DE" dirty="0" err="1" smtClean="0"/>
+              <a:t>for</a:t>
+            </a:r>
+            <a:r>
+              <a:rPr lang="de-DE" dirty="0" smtClean="0"/>
+              <a:t> </a:t>
+            </a:r>
+            <a:r>
+              <a:rPr lang="de-DE" dirty="0" err="1" smtClean="0"/>
+              <a:t>logical</a:t>
+            </a:r>
+            <a:r>
+              <a:rPr lang="de-DE" dirty="0" smtClean="0"/>
+              <a:t> </a:t>
+            </a:r>
+            <a:r>
+              <a:rPr lang="de-DE" dirty="0" err="1" smtClean="0"/>
+              <a:t>processing</a:t>
             </a:r>
             <a:endParaRPr lang="de-DE" dirty="0" smtClean="0"/>
           </a:p>
           <a:p>
             <a:pPr lvl="1"/>
             <a:r>
-              <a:rPr lang="de-DE" dirty="0" err="1" smtClean="0"/>
-              <a:t>Classes</a:t>
-            </a:r>
-            <a:r>
-              <a:rPr lang="de-DE" dirty="0" smtClean="0"/>
-              <a:t> </a:t>
-            </a:r>
-            <a:r>
-              <a:rPr lang="de-DE" dirty="0" err="1" smtClean="0"/>
-              <a:t>with</a:t>
-            </a:r>
-            <a:r>
-              <a:rPr lang="de-DE" dirty="0" smtClean="0"/>
-              <a:t> </a:t>
-            </a:r>
-            <a:r>
-              <a:rPr lang="de-DE" dirty="0" err="1" smtClean="0"/>
-              <a:t>annotations</a:t>
-            </a:r>
-            <a:r>
-              <a:rPr lang="de-DE" dirty="0" smtClean="0"/>
-              <a:t> </a:t>
-            </a:r>
-            <a:r>
-              <a:rPr lang="de-DE" dirty="0" err="1" smtClean="0"/>
-              <a:t>for</a:t>
-            </a:r>
-            <a:r>
-              <a:rPr lang="de-DE" dirty="0" smtClean="0"/>
-              <a:t> </a:t>
-            </a:r>
-            <a:r>
-              <a:rPr lang="de-DE" dirty="0" err="1" smtClean="0"/>
-              <a:t>Hibernate</a:t>
+              <a:rPr lang="de-DE" dirty="0" smtClean="0"/>
+              <a:t>All </a:t>
+            </a:r>
+            <a:r>
+              <a:rPr lang="de-DE" dirty="0" err="1" smtClean="0"/>
+              <a:t>classes</a:t>
+            </a:r>
+            <a:r>
+              <a:rPr lang="de-DE" dirty="0" smtClean="0"/>
+              <a:t> </a:t>
+            </a:r>
+            <a:r>
+              <a:rPr lang="de-DE" dirty="0" err="1" smtClean="0"/>
+              <a:t>are</a:t>
+            </a:r>
+            <a:r>
+              <a:rPr lang="de-DE" dirty="0" smtClean="0"/>
+              <a:t> </a:t>
+            </a:r>
+            <a:r>
+              <a:rPr lang="de-DE" dirty="0" err="1" smtClean="0"/>
+              <a:t>implemented</a:t>
+            </a:r>
+            <a:r>
+              <a:rPr lang="de-DE" dirty="0" smtClean="0"/>
+              <a:t> </a:t>
+            </a:r>
+            <a:r>
+              <a:rPr lang="de-DE" dirty="0" err="1" smtClean="0"/>
+              <a:t>to</a:t>
+            </a:r>
+            <a:r>
+              <a:rPr lang="de-DE" dirty="0" smtClean="0"/>
+              <a:t> a </a:t>
+            </a:r>
+            <a:r>
+              <a:rPr lang="de-DE" dirty="0" err="1" smtClean="0"/>
+              <a:t>interface</a:t>
             </a:r>
             <a:endParaRPr lang="de-DE" dirty="0" smtClean="0"/>
           </a:p>
           <a:p>
+            <a:pPr lvl="1"/>
+            <a:r>
+              <a:rPr lang="de-DE" dirty="0" err="1" smtClean="0"/>
+              <a:t>Contain</a:t>
+            </a:r>
+            <a:r>
+              <a:rPr lang="de-DE" dirty="0" smtClean="0"/>
+              <a:t> </a:t>
+            </a:r>
+            <a:r>
+              <a:rPr lang="de-DE" dirty="0" err="1" smtClean="0"/>
+              <a:t>static</a:t>
+            </a:r>
+            <a:r>
+              <a:rPr lang="de-DE" dirty="0" smtClean="0"/>
+              <a:t> </a:t>
+            </a:r>
+            <a:r>
+              <a:rPr lang="de-DE" dirty="0" err="1" smtClean="0"/>
+              <a:t>methods</a:t>
+            </a:r>
+            <a:r>
+              <a:rPr lang="de-DE" dirty="0" smtClean="0"/>
+              <a:t>:</a:t>
+            </a:r>
+          </a:p>
+          <a:p>
             <a:pPr lvl="2"/>
             <a:r>
               <a:rPr lang="de-DE" dirty="0" err="1" smtClean="0"/>
-              <a:t>Contain</a:t>
-            </a:r>
-            <a:r>
-              <a:rPr lang="de-DE" dirty="0" smtClean="0"/>
-              <a:t> </a:t>
-            </a:r>
-            <a:r>
-              <a:rPr lang="de-DE" dirty="0" err="1" smtClean="0"/>
-              <a:t>no</a:t>
-            </a:r>
-            <a:r>
-              <a:rPr lang="de-DE" dirty="0" smtClean="0"/>
-              <a:t> </a:t>
-            </a:r>
-            <a:r>
-              <a:rPr lang="de-DE" dirty="0" err="1" smtClean="0"/>
-              <a:t>logical</a:t>
-            </a:r>
-            <a:r>
-              <a:rPr lang="de-DE" dirty="0" smtClean="0"/>
-              <a:t> </a:t>
-            </a:r>
-            <a:r>
-              <a:rPr lang="de-DE" dirty="0" err="1" smtClean="0"/>
-              <a:t>functionality</a:t>
+              <a:t>To</a:t>
+            </a:r>
+            <a:r>
+              <a:rPr lang="de-DE" dirty="0" smtClean="0"/>
+              <a:t> </a:t>
+            </a:r>
+            <a:r>
+              <a:rPr lang="de-DE" dirty="0" err="1" smtClean="0"/>
+              <a:t>retrieve</a:t>
+            </a:r>
+            <a:r>
+              <a:rPr lang="de-DE" dirty="0" smtClean="0"/>
+              <a:t> a </a:t>
+            </a:r>
+            <a:r>
+              <a:rPr lang="de-DE" dirty="0" err="1" smtClean="0"/>
+              <a:t>object</a:t>
+            </a:r>
+            <a:r>
+              <a:rPr lang="de-DE" dirty="0" smtClean="0"/>
+              <a:t> </a:t>
+            </a:r>
+            <a:r>
+              <a:rPr lang="de-DE" dirty="0" err="1" smtClean="0"/>
+              <a:t>of</a:t>
+            </a:r>
+            <a:r>
+              <a:rPr lang="de-DE" dirty="0" smtClean="0"/>
+              <a:t> a </a:t>
+            </a:r>
+            <a:r>
+              <a:rPr lang="de-DE" dirty="0" err="1" smtClean="0"/>
+              <a:t>class</a:t>
+            </a:r>
+            <a:r>
+              <a:rPr lang="de-DE" dirty="0" smtClean="0"/>
+              <a:t>, via a </a:t>
+            </a:r>
+            <a:r>
+              <a:rPr lang="de-DE" dirty="0" err="1" smtClean="0"/>
+              <a:t>manager</a:t>
             </a:r>
             <a:endParaRPr lang="de-DE" dirty="0" smtClean="0"/>
           </a:p>
           <a:p>
-            <a:pPr lvl="1"/>
-            <a:r>
-              <a:rPr lang="de-DE" dirty="0" err="1" smtClean="0"/>
-              <a:t>Contains</a:t>
-            </a:r>
-            <a:r>
-              <a:rPr lang="de-DE" dirty="0" smtClean="0"/>
-              <a:t> manager-</a:t>
-            </a:r>
-            <a:r>
-              <a:rPr lang="de-DE" dirty="0" err="1" smtClean="0"/>
-              <a:t>classes</a:t>
-            </a:r>
-            <a:r>
-              <a:rPr lang="de-DE" dirty="0" smtClean="0"/>
-              <a:t> </a:t>
-            </a:r>
-            <a:r>
-              <a:rPr lang="de-DE" dirty="0" err="1" smtClean="0"/>
-              <a:t>for</a:t>
-            </a:r>
-            <a:r>
-              <a:rPr lang="de-DE" dirty="0" smtClean="0"/>
-              <a:t> </a:t>
-            </a:r>
-            <a:r>
-              <a:rPr lang="de-DE" dirty="0" err="1" smtClean="0"/>
-              <a:t>communication</a:t>
-            </a:r>
-            <a:r>
-              <a:rPr lang="de-DE" dirty="0" smtClean="0"/>
-              <a:t> </a:t>
-            </a:r>
-            <a:r>
-              <a:rPr lang="de-DE" dirty="0" err="1" smtClean="0"/>
-              <a:t>to</a:t>
-            </a:r>
-            <a:r>
-              <a:rPr lang="de-DE" dirty="0" smtClean="0"/>
-              <a:t> </a:t>
-            </a:r>
-            <a:r>
-              <a:rPr lang="de-DE" dirty="0" err="1" smtClean="0"/>
-              <a:t>database</a:t>
-            </a:r>
-            <a:r>
-              <a:rPr lang="de-DE" dirty="0" smtClean="0"/>
-              <a:t>:</a:t>
-            </a:r>
-          </a:p>
-          <a:p>
             <a:pPr lvl="2"/>
-            <a:r>
-              <a:rPr lang="de-DE" dirty="0" err="1" smtClean="0"/>
-              <a:t>For</a:t>
-            </a:r>
-            <a:r>
-              <a:rPr lang="de-DE" dirty="0" smtClean="0"/>
-              <a:t> </a:t>
-            </a:r>
-            <a:r>
-              <a:rPr lang="de-DE" dirty="0" err="1" smtClean="0"/>
-              <a:t>saving</a:t>
-            </a:r>
-            <a:r>
-              <a:rPr lang="de-DE" dirty="0" smtClean="0"/>
-              <a:t> </a:t>
-            </a:r>
-            <a:r>
-              <a:rPr lang="de-DE" dirty="0" err="1" smtClean="0"/>
-              <a:t>objects</a:t>
-            </a:r>
-            <a:endParaRPr lang="de-DE" dirty="0" smtClean="0"/>
-          </a:p>
-          <a:p>
-            <a:pPr lvl="2"/>
-            <a:r>
-              <a:rPr lang="de-DE" dirty="0" err="1" smtClean="0"/>
-              <a:t>To</a:t>
-            </a:r>
-            <a:r>
-              <a:rPr lang="de-DE" dirty="0" smtClean="0"/>
-              <a:t> </a:t>
-            </a:r>
-            <a:r>
-              <a:rPr lang="de-DE" dirty="0" err="1" smtClean="0"/>
-              <a:t>retrieve</a:t>
-            </a:r>
-            <a:r>
-              <a:rPr lang="de-DE" dirty="0" smtClean="0"/>
-              <a:t> </a:t>
-            </a:r>
-            <a:r>
-              <a:rPr lang="de-DE" dirty="0" err="1" smtClean="0"/>
-              <a:t>objects</a:t>
-            </a:r>
-            <a:endParaRPr lang="de-DE" dirty="0" smtClean="0"/>
-          </a:p>
-          <a:p>
-            <a:pPr lvl="1"/>
             <a:endParaRPr lang="de-DE" dirty="0"/>
           </a:p>
         </p:txBody>
@@ -5553,7 +5189,7 @@
     </p:spTree>
     <p:extLst>
       <p:ext uri="{BB962C8B-B14F-4D97-AF65-F5344CB8AC3E}">
-        <p14:creationId xmlns:p14="http://schemas.microsoft.com/office/powerpoint/2010/main" val="1336650562"/>
+        <p14:creationId xmlns:p14="http://schemas.microsoft.com/office/powerpoint/2010/main" val="1281719396"/>
       </p:ext>
     </p:extLst>
   </p:cSld>
@@ -5620,7 +5256,7 @@
           <a:p>
             <a:r>
               <a:rPr lang="de-DE" dirty="0" smtClean="0"/>
-              <a:t>Model</a:t>
+              <a:t>View</a:t>
             </a:r>
           </a:p>
           <a:p>
@@ -5631,13 +5267,169 @@
             </a:r>
             <a:r>
               <a:rPr lang="de-DE" dirty="0" smtClean="0"/>
-              <a:t> </a:t>
+              <a:t> all </a:t>
             </a:r>
             <a:r>
               <a:rPr lang="de-DE" dirty="0" err="1" smtClean="0"/>
               <a:t>classes</a:t>
             </a:r>
             <a:r>
+              <a:rPr lang="de-DE" dirty="0"/>
+              <a:t> </a:t>
+            </a:r>
+            <a:r>
+              <a:rPr lang="de-DE" dirty="0" err="1" smtClean="0"/>
+              <a:t>the</a:t>
+            </a:r>
+            <a:r>
+              <a:rPr lang="de-DE" dirty="0" smtClean="0"/>
+              <a:t> GUI </a:t>
+            </a:r>
+            <a:r>
+              <a:rPr lang="de-DE" dirty="0" err="1" smtClean="0"/>
+              <a:t>uses</a:t>
+            </a:r>
+            <a:endParaRPr lang="de-DE" dirty="0" smtClean="0"/>
+          </a:p>
+          <a:p>
+            <a:pPr lvl="1"/>
+            <a:r>
+              <a:rPr lang="de-DE" dirty="0" smtClean="0"/>
+              <a:t>Also </a:t>
+            </a:r>
+            <a:r>
+              <a:rPr lang="de-DE" dirty="0" err="1" smtClean="0"/>
+              <a:t>containing</a:t>
+            </a:r>
+            <a:r>
+              <a:rPr lang="de-DE" dirty="0" smtClean="0"/>
+              <a:t> </a:t>
+            </a:r>
+            <a:r>
+              <a:rPr lang="de-DE" dirty="0" err="1" smtClean="0"/>
+              <a:t>interfaces</a:t>
+            </a:r>
+            <a:r>
+              <a:rPr lang="de-DE" dirty="0" smtClean="0"/>
+              <a:t> </a:t>
+            </a:r>
+            <a:r>
+              <a:rPr lang="de-DE" dirty="0" err="1" smtClean="0"/>
+              <a:t>to</a:t>
+            </a:r>
+            <a:r>
+              <a:rPr lang="de-DE" dirty="0" smtClean="0"/>
+              <a:t> </a:t>
+            </a:r>
+            <a:r>
+              <a:rPr lang="de-DE" dirty="0" err="1" smtClean="0"/>
+              <a:t>hand</a:t>
+            </a:r>
+            <a:r>
+              <a:rPr lang="de-DE" dirty="0" smtClean="0"/>
+              <a:t> </a:t>
+            </a:r>
+            <a:r>
+              <a:rPr lang="de-DE" dirty="0" err="1" smtClean="0"/>
+              <a:t>over</a:t>
+            </a:r>
+            <a:r>
+              <a:rPr lang="de-DE" dirty="0"/>
+              <a:t> </a:t>
+            </a:r>
+            <a:r>
+              <a:rPr lang="de-DE" dirty="0" err="1" smtClean="0"/>
+              <a:t>information</a:t>
+            </a:r>
+            <a:r>
+              <a:rPr lang="de-DE" dirty="0" smtClean="0"/>
+              <a:t> </a:t>
+            </a:r>
+            <a:r>
+              <a:rPr lang="de-DE" dirty="0" err="1" smtClean="0"/>
+              <a:t>to</a:t>
+            </a:r>
+            <a:r>
+              <a:rPr lang="de-DE" dirty="0" smtClean="0"/>
+              <a:t> </a:t>
+            </a:r>
+            <a:r>
+              <a:rPr lang="de-DE" dirty="0" err="1" smtClean="0"/>
+              <a:t>the</a:t>
+            </a:r>
+            <a:r>
+              <a:rPr lang="de-DE" dirty="0" smtClean="0"/>
+              <a:t> </a:t>
+            </a:r>
+            <a:r>
+              <a:rPr lang="de-DE" dirty="0" err="1" smtClean="0"/>
+              <a:t>model</a:t>
+            </a:r>
+            <a:r>
+              <a:rPr lang="de-DE" dirty="0" smtClean="0"/>
+              <a:t> </a:t>
+            </a:r>
+            <a:r>
+              <a:rPr lang="de-DE" dirty="0" err="1" smtClean="0"/>
+              <a:t>layer</a:t>
+            </a:r>
+            <a:r>
+              <a:rPr lang="de-DE" dirty="0" smtClean="0"/>
+              <a:t> </a:t>
+            </a:r>
+            <a:r>
+              <a:rPr lang="de-DE" dirty="0" err="1" smtClean="0"/>
+              <a:t>and</a:t>
+            </a:r>
+            <a:r>
+              <a:rPr lang="de-DE" dirty="0" smtClean="0"/>
+              <a:t> </a:t>
+            </a:r>
+            <a:r>
+              <a:rPr lang="de-DE" dirty="0" err="1" smtClean="0"/>
+              <a:t>the</a:t>
+            </a:r>
+            <a:r>
+              <a:rPr lang="de-DE" dirty="0" smtClean="0"/>
+              <a:t> </a:t>
+            </a:r>
+            <a:r>
+              <a:rPr lang="de-DE" dirty="0" err="1" smtClean="0"/>
+              <a:t>other</a:t>
+            </a:r>
+            <a:r>
+              <a:rPr lang="de-DE" dirty="0" smtClean="0"/>
+              <a:t> </a:t>
+            </a:r>
+            <a:r>
+              <a:rPr lang="de-DE" dirty="0" err="1" smtClean="0"/>
+              <a:t>way</a:t>
+            </a:r>
+            <a:r>
+              <a:rPr lang="de-DE" dirty="0" smtClean="0"/>
+              <a:t> </a:t>
+            </a:r>
+            <a:r>
+              <a:rPr lang="de-DE" dirty="0" err="1" smtClean="0"/>
+              <a:t>round</a:t>
+            </a:r>
+            <a:endParaRPr lang="de-DE" dirty="0" smtClean="0"/>
+          </a:p>
+          <a:p>
+            <a:pPr lvl="1"/>
+            <a:r>
+              <a:rPr lang="de-DE" dirty="0" err="1" smtClean="0"/>
+              <a:t>Specific</a:t>
+            </a:r>
+            <a:r>
+              <a:rPr lang="de-DE" dirty="0" smtClean="0"/>
+              <a:t> </a:t>
+            </a:r>
+            <a:r>
+              <a:rPr lang="de-DE" dirty="0" err="1" smtClean="0"/>
+              <a:t>controller</a:t>
+            </a:r>
+            <a:r>
               <a:rPr lang="de-DE" dirty="0" smtClean="0"/>
               <a:t> </a:t>
             </a:r>
@@ -5647,143 +5439,12 @@
             </a:r>
             <a:r>
               <a:rPr lang="de-DE" dirty="0" smtClean="0"/>
-              <a:t> </a:t>
-            </a:r>
-            <a:r>
-              <a:rPr lang="de-DE" dirty="0" err="1" smtClean="0"/>
-              <a:t>logical</a:t>
-            </a:r>
-            <a:r>
-              <a:rPr lang="de-DE" dirty="0" smtClean="0"/>
-              <a:t> </a:t>
-            </a:r>
-            <a:r>
-              <a:rPr lang="de-DE" dirty="0" err="1" smtClean="0"/>
-              <a:t>processing</a:t>
-            </a:r>
-            <a:endParaRPr lang="de-DE" dirty="0" smtClean="0"/>
-          </a:p>
-          <a:p>
-            <a:pPr lvl="1"/>
-            <a:r>
-              <a:rPr lang="de-DE" dirty="0" smtClean="0"/>
-              <a:t>All </a:t>
-            </a:r>
-            <a:r>
-              <a:rPr lang="de-DE" dirty="0" err="1" smtClean="0"/>
-              <a:t>classes</a:t>
-            </a:r>
-            <a:r>
-              <a:rPr lang="de-DE" dirty="0" smtClean="0"/>
-              <a:t> </a:t>
-            </a:r>
-            <a:r>
-              <a:rPr lang="de-DE" dirty="0" err="1" smtClean="0"/>
-              <a:t>are</a:t>
-            </a:r>
-            <a:r>
-              <a:rPr lang="de-DE" dirty="0" smtClean="0"/>
-              <a:t> </a:t>
-            </a:r>
-            <a:r>
-              <a:rPr lang="de-DE" dirty="0" err="1" smtClean="0"/>
-              <a:t>implemented</a:t>
-            </a:r>
-            <a:r>
-              <a:rPr lang="de-DE" dirty="0" smtClean="0"/>
-              <a:t> </a:t>
-            </a:r>
-            <a:r>
-              <a:rPr lang="de-DE" dirty="0" err="1" smtClean="0"/>
-              <a:t>to</a:t>
-            </a:r>
-            <a:r>
-              <a:rPr lang="de-DE" dirty="0" smtClean="0"/>
-              <a:t> a </a:t>
-            </a:r>
-            <a:r>
-              <a:rPr lang="de-DE" dirty="0" err="1" smtClean="0"/>
-              <a:t>interface</a:t>
-            </a:r>
-            <a:endParaRPr lang="de-DE" dirty="0" smtClean="0"/>
-          </a:p>
-          <a:p>
-            <a:pPr lvl="1"/>
-            <a:r>
-              <a:rPr lang="de-DE" dirty="0" err="1" smtClean="0"/>
-              <a:t>Contain</a:t>
-            </a:r>
-            <a:r>
-              <a:rPr lang="de-DE" dirty="0" smtClean="0"/>
-              <a:t> </a:t>
-            </a:r>
-            <a:r>
-              <a:rPr lang="de-DE" dirty="0" err="1" smtClean="0"/>
-              <a:t>static</a:t>
-            </a:r>
-            <a:r>
-              <a:rPr lang="de-DE" dirty="0" smtClean="0"/>
-              <a:t> </a:t>
-            </a:r>
-            <a:r>
-              <a:rPr lang="de-DE" dirty="0" err="1" smtClean="0"/>
-              <a:t>methods</a:t>
-            </a:r>
-            <a:r>
-              <a:rPr lang="de-DE" dirty="0" smtClean="0"/>
-              <a:t>:</a:t>
-            </a:r>
-          </a:p>
-          <a:p>
-            <a:pPr lvl="2"/>
-            <a:r>
-              <a:rPr lang="de-DE" dirty="0" err="1" smtClean="0"/>
-              <a:t>To</a:t>
-            </a:r>
-            <a:r>
-              <a:rPr lang="de-DE" dirty="0" smtClean="0"/>
-              <a:t> </a:t>
-            </a:r>
-            <a:r>
-              <a:rPr lang="de-DE" dirty="0" err="1" smtClean="0"/>
-              <a:t>retrieve</a:t>
-            </a:r>
-            <a:r>
-              <a:rPr lang="de-DE" dirty="0" smtClean="0"/>
-              <a:t> a </a:t>
-            </a:r>
-            <a:r>
-              <a:rPr lang="de-DE" dirty="0" err="1" smtClean="0"/>
-              <a:t>object</a:t>
-            </a:r>
-            <a:r>
-              <a:rPr lang="de-DE" dirty="0" smtClean="0"/>
-              <a:t> </a:t>
-            </a:r>
-            <a:r>
-              <a:rPr lang="de-DE" dirty="0" err="1" smtClean="0"/>
-              <a:t>of</a:t>
-            </a:r>
-            <a:r>
-              <a:rPr lang="de-DE" dirty="0" smtClean="0"/>
-              <a:t> a </a:t>
-            </a:r>
-            <a:r>
-              <a:rPr lang="de-DE" dirty="0" err="1" smtClean="0"/>
-              <a:t>class</a:t>
-            </a:r>
-            <a:r>
-              <a:rPr lang="de-DE" dirty="0" smtClean="0"/>
-              <a:t>, via a </a:t>
-            </a:r>
-            <a:r>
-              <a:rPr lang="de-DE" dirty="0" err="1" smtClean="0"/>
-              <a:t>manager</a:t>
-            </a:r>
-            <a:endParaRPr lang="de-DE" dirty="0" smtClean="0"/>
-          </a:p>
-          <a:p>
-            <a:pPr lvl="2"/>
+              <a:t> GUI </a:t>
+            </a:r>
+            <a:r>
+              <a:rPr lang="de-DE" dirty="0" err="1" smtClean="0"/>
+              <a:t>operations</a:t>
+            </a:r>
             <a:endParaRPr lang="de-DE" dirty="0"/>
           </a:p>
         </p:txBody>
@@ -5791,7 +5452,7 @@
     </p:spTree>
     <p:extLst>
       <p:ext uri="{BB962C8B-B14F-4D97-AF65-F5344CB8AC3E}">
-        <p14:creationId xmlns:p14="http://schemas.microsoft.com/office/powerpoint/2010/main" val="1281719396"/>
+        <p14:creationId xmlns:p14="http://schemas.microsoft.com/office/powerpoint/2010/main" val="3348423394"/>
       </p:ext>
     </p:extLst>
   </p:cSld>
@@ -5858,25 +5519,73 @@
           <a:p>
             <a:r>
               <a:rPr lang="de-DE" dirty="0" smtClean="0"/>
-              <a:t>View</a:t>
+              <a:t>Controller</a:t>
             </a:r>
           </a:p>
           <a:p>
             <a:pPr lvl="1"/>
             <a:r>
               <a:rPr lang="de-DE" dirty="0" err="1" smtClean="0"/>
-              <a:t>Contains</a:t>
-            </a:r>
-            <a:r>
-              <a:rPr lang="de-DE" dirty="0" smtClean="0"/>
-              <a:t> all </a:t>
-            </a:r>
-            <a:r>
-              <a:rPr lang="de-DE" dirty="0" err="1" smtClean="0"/>
-              <a:t>classes</a:t>
-            </a:r>
-            <a:r>
-              <a:rPr lang="de-DE" dirty="0"/>
+              <a:t>For</a:t>
+            </a:r>
+            <a:r>
+              <a:rPr lang="de-DE" dirty="0" smtClean="0"/>
+              <a:t> </a:t>
+            </a:r>
+            <a:r>
+              <a:rPr lang="de-DE" dirty="0" err="1" smtClean="0"/>
+              <a:t>each</a:t>
+            </a:r>
+            <a:r>
+              <a:rPr lang="de-DE" dirty="0" smtClean="0"/>
+              <a:t> </a:t>
+            </a:r>
+            <a:r>
+              <a:rPr lang="de-DE" dirty="0" err="1" smtClean="0"/>
+              <a:t>use-case</a:t>
+            </a:r>
+            <a:r>
+              <a:rPr lang="de-DE" dirty="0" smtClean="0"/>
+              <a:t> </a:t>
+            </a:r>
+            <a:r>
+              <a:rPr lang="de-DE" dirty="0" err="1" smtClean="0"/>
+              <a:t>one</a:t>
+            </a:r>
+            <a:r>
+              <a:rPr lang="de-DE" dirty="0" smtClean="0"/>
+              <a:t> </a:t>
+            </a:r>
+            <a:r>
+              <a:rPr lang="de-DE" dirty="0" err="1" smtClean="0"/>
+              <a:t>controller</a:t>
+            </a:r>
+            <a:endParaRPr lang="de-DE" dirty="0" smtClean="0"/>
+          </a:p>
+          <a:p>
+            <a:pPr lvl="1"/>
+            <a:r>
+              <a:rPr lang="de-DE" dirty="0" err="1" smtClean="0"/>
+              <a:t>Each</a:t>
+            </a:r>
+            <a:r>
+              <a:rPr lang="de-DE" dirty="0" smtClean="0"/>
+              <a:t> </a:t>
+            </a:r>
+            <a:r>
+              <a:rPr lang="de-DE" dirty="0" err="1" smtClean="0"/>
+              <a:t>controller</a:t>
+            </a:r>
+            <a:r>
+              <a:rPr lang="de-DE" dirty="0" smtClean="0"/>
+              <a:t> </a:t>
+            </a:r>
+            <a:r>
+              <a:rPr lang="de-DE" dirty="0" err="1" smtClean="0"/>
+              <a:t>implements</a:t>
+            </a:r>
+            <a:r>
+              <a:rPr lang="de-DE" dirty="0" smtClean="0"/>
               <a:t> </a:t>
             </a:r>
             <a:r>
@@ -5885,143 +5594,15 @@
             </a:r>
             <a:r>
               <a:rPr lang="de-DE" dirty="0" smtClean="0"/>
-              <a:t> GUI </a:t>
-            </a:r>
-            <a:r>
-              <a:rPr lang="de-DE" dirty="0" err="1" smtClean="0"/>
-              <a:t>uses</a:t>
-            </a:r>
-            <a:endParaRPr lang="de-DE" dirty="0" smtClean="0"/>
-          </a:p>
-          <a:p>
-            <a:pPr lvl="1"/>
-            <a:r>
-              <a:rPr lang="de-DE" dirty="0" smtClean="0"/>
-              <a:t>Also </a:t>
-            </a:r>
-            <a:r>
-              <a:rPr lang="de-DE" dirty="0" err="1" smtClean="0"/>
-              <a:t>containing</a:t>
-            </a:r>
-            <a:r>
-              <a:rPr lang="de-DE" dirty="0" smtClean="0"/>
-              <a:t> </a:t>
-            </a:r>
-            <a:r>
-              <a:rPr lang="de-DE" dirty="0" err="1" smtClean="0"/>
-              <a:t>interfaces</a:t>
-            </a:r>
-            <a:r>
-              <a:rPr lang="de-DE" dirty="0" smtClean="0"/>
-              <a:t> </a:t>
-            </a:r>
-            <a:r>
-              <a:rPr lang="de-DE" dirty="0" err="1" smtClean="0"/>
-              <a:t>to</a:t>
-            </a:r>
-            <a:r>
-              <a:rPr lang="de-DE" dirty="0" smtClean="0"/>
-              <a:t> </a:t>
-            </a:r>
-            <a:r>
-              <a:rPr lang="de-DE" dirty="0" err="1" smtClean="0"/>
-              <a:t>hand</a:t>
-            </a:r>
-            <a:r>
-              <a:rPr lang="de-DE" dirty="0" smtClean="0"/>
-              <a:t> </a:t>
-            </a:r>
-            <a:r>
-              <a:rPr lang="de-DE" dirty="0" err="1" smtClean="0"/>
-              <a:t>over</a:t>
-            </a:r>
-            <a:r>
-              <a:rPr lang="de-DE" dirty="0"/>
-              <a:t> </a:t>
-            </a:r>
-            <a:r>
-              <a:rPr lang="de-DE" dirty="0" err="1" smtClean="0"/>
-              <a:t>information</a:t>
-            </a:r>
-            <a:r>
-              <a:rPr lang="de-DE" dirty="0" smtClean="0"/>
-              <a:t> </a:t>
-            </a:r>
-            <a:r>
-              <a:rPr lang="de-DE" dirty="0" err="1" smtClean="0"/>
-              <a:t>to</a:t>
-            </a:r>
-            <a:r>
-              <a:rPr lang="de-DE" dirty="0" smtClean="0"/>
-              <a:t> </a:t>
-            </a:r>
-            <a:r>
-              <a:rPr lang="de-DE" dirty="0" err="1" smtClean="0"/>
-              <a:t>the</a:t>
-            </a:r>
-            <a:r>
-              <a:rPr lang="de-DE" dirty="0" smtClean="0"/>
-              <a:t> </a:t>
-            </a:r>
-            <a:r>
-              <a:rPr lang="de-DE" dirty="0" err="1" smtClean="0"/>
-              <a:t>model</a:t>
-            </a:r>
-            <a:r>
-              <a:rPr lang="de-DE" dirty="0" smtClean="0"/>
-              <a:t> </a:t>
-            </a:r>
-            <a:r>
-              <a:rPr lang="de-DE" dirty="0" err="1" smtClean="0"/>
-              <a:t>layer</a:t>
-            </a:r>
-            <a:r>
-              <a:rPr lang="de-DE" dirty="0" smtClean="0"/>
-              <a:t> </a:t>
-            </a:r>
-            <a:r>
-              <a:rPr lang="de-DE" dirty="0" err="1" smtClean="0"/>
-              <a:t>and</a:t>
-            </a:r>
-            <a:r>
-              <a:rPr lang="de-DE" dirty="0" smtClean="0"/>
-              <a:t> </a:t>
-            </a:r>
-            <a:r>
-              <a:rPr lang="de-DE" dirty="0" err="1" smtClean="0"/>
-              <a:t>the</a:t>
-            </a:r>
-            <a:r>
-              <a:rPr lang="de-DE" dirty="0" smtClean="0"/>
-              <a:t> </a:t>
-            </a:r>
-            <a:r>
-              <a:rPr lang="de-DE" dirty="0" err="1" smtClean="0"/>
-              <a:t>other</a:t>
-            </a:r>
-            <a:r>
-              <a:rPr lang="de-DE" dirty="0" smtClean="0"/>
-              <a:t> </a:t>
-            </a:r>
-            <a:r>
-              <a:rPr lang="de-DE" dirty="0" err="1" smtClean="0"/>
-              <a:t>way</a:t>
-            </a:r>
-            <a:r>
-              <a:rPr lang="de-DE" dirty="0" smtClean="0"/>
-              <a:t> </a:t>
-            </a:r>
-            <a:r>
-              <a:rPr lang="de-DE" dirty="0" err="1" smtClean="0"/>
-              <a:t>round</a:t>
-            </a:r>
-            <a:endParaRPr lang="de-DE" dirty="0" smtClean="0"/>
-          </a:p>
-          <a:p>
-            <a:pPr lvl="1"/>
-            <a:r>
-              <a:rPr lang="de-DE" dirty="0" smtClean="0"/>
-              <a:t>...</a:t>
+              <a:t> </a:t>
+            </a:r>
+            <a:r>
+              <a:rPr lang="de-DE" dirty="0" err="1" smtClean="0"/>
+              <a:t>state</a:t>
+            </a:r>
+            <a:r>
+              <a:rPr lang="de-DE" dirty="0" smtClean="0"/>
+              <a:t>-pattern</a:t>
             </a:r>
             <a:endParaRPr lang="de-DE" dirty="0"/>
           </a:p>
@@ -6030,7 +5611,7 @@
     </p:spTree>
     <p:extLst>
       <p:ext uri="{BB962C8B-B14F-4D97-AF65-F5344CB8AC3E}">
-        <p14:creationId xmlns:p14="http://schemas.microsoft.com/office/powerpoint/2010/main" val="3348423394"/>
+        <p14:creationId xmlns:p14="http://schemas.microsoft.com/office/powerpoint/2010/main" val="3165480202"/>
       </p:ext>
     </p:extLst>
   </p:cSld>
@@ -6096,91 +5677,118 @@
           <a:lstStyle/>
           <a:p>
             <a:r>
-              <a:rPr lang="de-DE" dirty="0" smtClean="0"/>
-              <a:t>Controller</a:t>
+              <a:rPr lang="de-DE" dirty="0" err="1" smtClean="0"/>
+              <a:t>Webarchitecture</a:t>
+            </a:r>
+            <a:r>
+              <a:rPr lang="de-DE" dirty="0" smtClean="0"/>
+              <a:t>:</a:t>
             </a:r>
           </a:p>
           <a:p>
             <a:pPr lvl="1"/>
             <a:r>
               <a:rPr lang="de-DE" dirty="0" err="1" smtClean="0"/>
-              <a:t>For</a:t>
-            </a:r>
-            <a:r>
-              <a:rPr lang="de-DE" dirty="0" smtClean="0"/>
-              <a:t> </a:t>
-            </a:r>
-            <a:r>
-              <a:rPr lang="de-DE" dirty="0" err="1" smtClean="0"/>
-              <a:t>each</a:t>
-            </a:r>
-            <a:r>
-              <a:rPr lang="de-DE" dirty="0" smtClean="0"/>
-              <a:t> </a:t>
-            </a:r>
-            <a:r>
-              <a:rPr lang="de-DE" dirty="0" err="1" smtClean="0"/>
-              <a:t>use-case</a:t>
-            </a:r>
-            <a:r>
-              <a:rPr lang="de-DE" dirty="0" smtClean="0"/>
-              <a:t> </a:t>
-            </a:r>
-            <a:r>
-              <a:rPr lang="de-DE" dirty="0" err="1" smtClean="0"/>
-              <a:t>one</a:t>
-            </a:r>
-            <a:r>
-              <a:rPr lang="de-DE" dirty="0" smtClean="0"/>
-              <a:t> </a:t>
+              <a:t>Able</a:t>
+            </a:r>
+            <a:r>
+              <a:rPr lang="de-DE" dirty="0" smtClean="0"/>
+              <a:t> </a:t>
+            </a:r>
+            <a:r>
+              <a:rPr lang="de-DE" dirty="0" err="1" smtClean="0"/>
+              <a:t>to</a:t>
+            </a:r>
+            <a:r>
+              <a:rPr lang="de-DE" dirty="0" smtClean="0"/>
+              <a:t> </a:t>
+            </a:r>
+            <a:r>
+              <a:rPr lang="de-DE" dirty="0" err="1" smtClean="0"/>
+              <a:t>replace</a:t>
+            </a:r>
+            <a:r>
+              <a:rPr lang="de-DE" dirty="0" smtClean="0"/>
+              <a:t> SWING GUI </a:t>
+            </a:r>
+            <a:r>
+              <a:rPr lang="de-DE" dirty="0" err="1" smtClean="0"/>
+              <a:t>with</a:t>
+            </a:r>
+            <a:r>
+              <a:rPr lang="de-DE" dirty="0" smtClean="0"/>
+              <a:t> JSF</a:t>
+            </a:r>
+          </a:p>
+          <a:p>
+            <a:pPr lvl="1"/>
+            <a:r>
+              <a:rPr lang="de-DE" dirty="0" err="1" smtClean="0"/>
+              <a:t>Complete</a:t>
+            </a:r>
+            <a:r>
+              <a:rPr lang="de-DE" dirty="0" smtClean="0"/>
+              <a:t> </a:t>
+            </a:r>
+            <a:r>
+              <a:rPr lang="de-DE" dirty="0" err="1" smtClean="0"/>
+              <a:t>logical</a:t>
+            </a:r>
+            <a:r>
+              <a:rPr lang="de-DE" dirty="0" smtClean="0"/>
+              <a:t> </a:t>
+            </a:r>
+            <a:r>
+              <a:rPr lang="de-DE" dirty="0" err="1" smtClean="0"/>
+              <a:t>processing</a:t>
+            </a:r>
+            <a:r>
+              <a:rPr lang="de-DE" dirty="0" smtClean="0"/>
+              <a:t> still in </a:t>
             </a:r>
             <a:r>
               <a:rPr lang="de-DE" dirty="0" err="1" smtClean="0"/>
               <a:t>controller</a:t>
             </a:r>
+            <a:r>
+              <a:rPr lang="de-DE" dirty="0" smtClean="0"/>
+              <a:t> </a:t>
+            </a:r>
+            <a:r>
+              <a:rPr lang="de-DE" dirty="0" err="1" smtClean="0"/>
+              <a:t>layer</a:t>
+            </a:r>
             <a:endParaRPr lang="de-DE" dirty="0" smtClean="0"/>
           </a:p>
           <a:p>
             <a:pPr lvl="1"/>
             <a:r>
               <a:rPr lang="de-DE" dirty="0" err="1" smtClean="0"/>
-              <a:t>Each</a:t>
-            </a:r>
-            <a:r>
-              <a:rPr lang="de-DE" dirty="0" smtClean="0"/>
-              <a:t> </a:t>
+              <a:t>Managed</a:t>
+            </a:r>
+            <a:r>
+              <a:rPr lang="de-DE" dirty="0" smtClean="0"/>
+              <a:t> </a:t>
+            </a:r>
+            <a:r>
+              <a:rPr lang="de-DE" dirty="0" err="1" smtClean="0"/>
+              <a:t>beans</a:t>
+            </a:r>
+            <a:r>
+              <a:rPr lang="de-DE" dirty="0" smtClean="0"/>
+              <a:t> </a:t>
+            </a:r>
+            <a:r>
+              <a:rPr lang="de-DE" dirty="0" err="1" smtClean="0"/>
+              <a:t>as</a:t>
+            </a:r>
+            <a:r>
+              <a:rPr lang="de-DE" dirty="0" smtClean="0"/>
+              <a:t> GUI </a:t>
             </a:r>
             <a:r>
               <a:rPr lang="de-DE" dirty="0" err="1" smtClean="0"/>
               <a:t>controller</a:t>
-            </a:r>
-            <a:r>
-              <a:rPr lang="de-DE" dirty="0" smtClean="0"/>
-              <a:t> </a:t>
-            </a:r>
-            <a:r>
-              <a:rPr lang="de-DE" dirty="0" err="1" smtClean="0"/>
-              <a:t>implements</a:t>
-            </a:r>
-            <a:r>
-              <a:rPr lang="de-DE" dirty="0"/>
-              <a:t> </a:t>
-            </a:r>
-            <a:r>
-              <a:rPr lang="de-DE" dirty="0" err="1" smtClean="0"/>
-              <a:t>the</a:t>
-            </a:r>
-            <a:r>
-              <a:rPr lang="de-DE" dirty="0" smtClean="0"/>
-              <a:t> </a:t>
-            </a:r>
-            <a:r>
-              <a:rPr lang="de-DE" dirty="0" err="1" smtClean="0"/>
-              <a:t>state</a:t>
-            </a:r>
-            <a:r>
-              <a:rPr lang="de-DE" dirty="0" smtClean="0"/>
-              <a:t>-pattern</a:t>
             </a:r>
             <a:endParaRPr lang="de-DE" dirty="0"/>
           </a:p>
@@ -6189,7 +5797,7 @@
     </p:spTree>
     <p:extLst>
       <p:ext uri="{BB962C8B-B14F-4D97-AF65-F5344CB8AC3E}">
-        <p14:creationId xmlns:p14="http://schemas.microsoft.com/office/powerpoint/2010/main" val="3165480202"/>
+        <p14:creationId xmlns:p14="http://schemas.microsoft.com/office/powerpoint/2010/main" val="915239833"/>
       </p:ext>
     </p:extLst>
   </p:cSld>

</xml_diff>